<commit_message>
adding missing comments and documentation
</commit_message>
<xml_diff>
--- a/source/Samples/MultisequenceLearning/documentation/presentation.pptx
+++ b/source/Samples/MultisequenceLearning/documentation/presentation.pptx
@@ -8821,7 +8821,7 @@
           <a:p>
             <a:fld id="{9232B5EC-DF79-4E8D-ABBA-B243A01BC291}" type="datetimeFigureOut">
               <a:rPr lang="en-IN" smtClean="0"/>
-              <a:t>17-03-2024</a:t>
+              <a:t>28-03-2024</a:t>
             </a:fld>
             <a:endParaRPr lang="en-IN"/>
           </a:p>
@@ -9135,17 +9135,19 @@
           <a:p>
             <a:r>
               <a:rPr lang="en-US" dirty="0"/>
+              <a:t>Script is mentioned in notes for detail understanding while going through the presentation:</a:t>
+            </a:r>
+          </a:p>
+          <a:p>
+            <a:r>
+              <a:rPr lang="en-US" dirty="0"/>
               <a:t>Slide 1:</a:t>
             </a:r>
           </a:p>
           <a:p>
             <a:r>
-              <a:rPr lang="en-US" dirty="0" err="1"/>
-              <a:t>Indroduce</a:t>
-            </a:r>
-            <a:r>
               <a:rPr lang="en-US" dirty="0"/>
-              <a:t> yourself and name of experiment</a:t>
+              <a:t>Introduce yourself and name of experiment</a:t>
             </a:r>
             <a:endParaRPr lang="en-IN" dirty="0"/>
           </a:p>
@@ -9263,15 +9265,7 @@
           <a:p>
             <a:r>
               <a:rPr lang="en-US" dirty="0"/>
-              <a:t>4. Of </a:t>
-            </a:r>
-            <a:r>
-              <a:rPr lang="en-US" dirty="0" err="1"/>
-              <a:t>cource</a:t>
-            </a:r>
-            <a:r>
-              <a:rPr lang="en-US" dirty="0"/>
-              <a:t> we learn the sequences and predict using Multisequence learning</a:t>
+              <a:t>4. Of course we learn the sequences and predict using Multisequence learning</a:t>
             </a:r>
           </a:p>
           <a:p>
@@ -12433,7 +12427,7 @@
             <a:fld id="{A5B0A250-5CC0-1746-B209-08E8B0DAE6AF}" type="datetimeFigureOut">
               <a:rPr lang="en-US" smtClean="0"/>
               <a:pPr algn="l"/>
-              <a:t>3/17/2024</a:t>
+              <a:t>3/28/2024</a:t>
             </a:fld>
             <a:endParaRPr lang="en-US" dirty="0"/>
           </a:p>
@@ -13895,7 +13889,7 @@
           <a:p>
             <a:fld id="{A5B0A250-5CC0-1746-B209-08E8B0DAE6AF}" type="datetimeFigureOut">
               <a:rPr lang="en-US" smtClean="0"/>
-              <a:t>3/17/2024</a:t>
+              <a:t>3/28/2024</a:t>
             </a:fld>
             <a:endParaRPr lang="en-US" dirty="0"/>
           </a:p>
@@ -14825,7 +14819,7 @@
           <a:p>
             <a:fld id="{A5B0A250-5CC0-1746-B209-08E8B0DAE6AF}" type="datetimeFigureOut">
               <a:rPr lang="en-US" smtClean="0"/>
-              <a:t>3/17/2024</a:t>
+              <a:t>3/28/2024</a:t>
             </a:fld>
             <a:endParaRPr lang="en-US"/>
           </a:p>
@@ -16282,7 +16276,7 @@
           <a:p>
             <a:fld id="{A5B0A250-5CC0-1746-B209-08E8B0DAE6AF}" type="datetimeFigureOut">
               <a:rPr lang="en-US" smtClean="0"/>
-              <a:t>3/17/2024</a:t>
+              <a:t>3/28/2024</a:t>
             </a:fld>
             <a:endParaRPr lang="en-US" dirty="0"/>
           </a:p>
@@ -18638,7 +18632,7 @@
           <a:p>
             <a:fld id="{A5B0A250-5CC0-1746-B209-08E8B0DAE6AF}" type="datetimeFigureOut">
               <a:rPr lang="en-US" smtClean="0"/>
-              <a:t>3/17/2024</a:t>
+              <a:t>3/28/2024</a:t>
             </a:fld>
             <a:endParaRPr lang="en-US" dirty="0"/>
           </a:p>
@@ -19679,7 +19673,7 @@
           <a:p>
             <a:fld id="{A5B0A250-5CC0-1746-B209-08E8B0DAE6AF}" type="datetimeFigureOut">
               <a:rPr lang="en-US" smtClean="0"/>
-              <a:t>3/17/2024</a:t>
+              <a:t>3/28/2024</a:t>
             </a:fld>
             <a:endParaRPr lang="en-US" dirty="0"/>
           </a:p>
@@ -20892,7 +20886,7 @@
           <a:p>
             <a:fld id="{A5B0A250-5CC0-1746-B209-08E8B0DAE6AF}" type="datetimeFigureOut">
               <a:rPr lang="en-US" smtClean="0"/>
-              <a:t>3/17/2024</a:t>
+              <a:t>3/28/2024</a:t>
             </a:fld>
             <a:endParaRPr lang="en-US" dirty="0"/>
           </a:p>
@@ -21801,7 +21795,7 @@
           <a:p>
             <a:fld id="{A5B0A250-5CC0-1746-B209-08E8B0DAE6AF}" type="datetimeFigureOut">
               <a:rPr lang="en-US" smtClean="0"/>
-              <a:t>3/17/2024</a:t>
+              <a:t>3/28/2024</a:t>
             </a:fld>
             <a:endParaRPr lang="en-US" dirty="0"/>
           </a:p>
@@ -21960,7 +21954,7 @@
             <a:fld id="{A5B0A250-5CC0-1746-B209-08E8B0DAE6AF}" type="datetimeFigureOut">
               <a:rPr lang="en-US" smtClean="0"/>
               <a:pPr/>
-              <a:t>3/17/2024</a:t>
+              <a:t>3/28/2024</a:t>
             </a:fld>
             <a:endParaRPr lang="en-US" dirty="0"/>
           </a:p>
@@ -22943,7 +22937,7 @@
           <a:p>
             <a:fld id="{A5B0A250-5CC0-1746-B209-08E8B0DAE6AF}" type="datetimeFigureOut">
               <a:rPr lang="en-US" smtClean="0"/>
-              <a:t>3/17/2024</a:t>
+              <a:t>3/28/2024</a:t>
             </a:fld>
             <a:endParaRPr lang="en-US" dirty="0"/>
           </a:p>
@@ -24005,7 +23999,7 @@
           <a:p>
             <a:fld id="{A5B0A250-5CC0-1746-B209-08E8B0DAE6AF}" type="datetimeFigureOut">
               <a:rPr lang="en-US" smtClean="0"/>
-              <a:t>3/17/2024</a:t>
+              <a:t>3/28/2024</a:t>
             </a:fld>
             <a:endParaRPr lang="en-US" dirty="0"/>
           </a:p>
@@ -24293,7 +24287,7 @@
             <a:fld id="{A5B0A250-5CC0-1746-B209-08E8B0DAE6AF}" type="datetimeFigureOut">
               <a:rPr lang="en-US" smtClean="0"/>
               <a:pPr/>
-              <a:t>3/17/2024</a:t>
+              <a:t>3/28/2024</a:t>
             </a:fld>
             <a:endParaRPr lang="en-US" dirty="0"/>
           </a:p>
@@ -28546,7 +28540,7 @@
           <p:nvPr>
             <p:extLst>
               <p:ext uri="{D42A27DB-BD31-4B8C-83A1-F6EECF244321}">
-                <p14:modId xmlns:p14="http://schemas.microsoft.com/office/powerpoint/2010/main" val="3135176686"/>
+                <p14:modId xmlns:p14="http://schemas.microsoft.com/office/powerpoint/2010/main" val="416827879"/>
               </p:ext>
             </p:extLst>
           </p:nvPr>

</xml_diff>